<commit_message>
Image and README update
</commit_message>
<xml_diff>
--- a/assets/image.pptx
+++ b/assets/image.pptx
@@ -259,7 +259,7 @@
           <a:p>
             <a:fld id="{68F73182-45FD-4099-A5BA-1AFBC9E3E2B0}" type="datetimeFigureOut">
               <a:rPr lang="en-US" smtClean="0"/>
-              <a:t>5/6/2019</a:t>
+              <a:t>2/22/2020</a:t>
             </a:fld>
             <a:endParaRPr lang="en-US"/>
           </a:p>
@@ -457,7 +457,7 @@
           <a:p>
             <a:fld id="{68F73182-45FD-4099-A5BA-1AFBC9E3E2B0}" type="datetimeFigureOut">
               <a:rPr lang="en-US" smtClean="0"/>
-              <a:t>5/6/2019</a:t>
+              <a:t>2/22/2020</a:t>
             </a:fld>
             <a:endParaRPr lang="en-US"/>
           </a:p>
@@ -665,7 +665,7 @@
           <a:p>
             <a:fld id="{68F73182-45FD-4099-A5BA-1AFBC9E3E2B0}" type="datetimeFigureOut">
               <a:rPr lang="en-US" smtClean="0"/>
-              <a:t>5/6/2019</a:t>
+              <a:t>2/22/2020</a:t>
             </a:fld>
             <a:endParaRPr lang="en-US"/>
           </a:p>
@@ -863,7 +863,7 @@
           <a:p>
             <a:fld id="{68F73182-45FD-4099-A5BA-1AFBC9E3E2B0}" type="datetimeFigureOut">
               <a:rPr lang="en-US" smtClean="0"/>
-              <a:t>5/6/2019</a:t>
+              <a:t>2/22/2020</a:t>
             </a:fld>
             <a:endParaRPr lang="en-US"/>
           </a:p>
@@ -1138,7 +1138,7 @@
           <a:p>
             <a:fld id="{68F73182-45FD-4099-A5BA-1AFBC9E3E2B0}" type="datetimeFigureOut">
               <a:rPr lang="en-US" smtClean="0"/>
-              <a:t>5/6/2019</a:t>
+              <a:t>2/22/2020</a:t>
             </a:fld>
             <a:endParaRPr lang="en-US"/>
           </a:p>
@@ -1403,7 +1403,7 @@
           <a:p>
             <a:fld id="{68F73182-45FD-4099-A5BA-1AFBC9E3E2B0}" type="datetimeFigureOut">
               <a:rPr lang="en-US" smtClean="0"/>
-              <a:t>5/6/2019</a:t>
+              <a:t>2/22/2020</a:t>
             </a:fld>
             <a:endParaRPr lang="en-US"/>
           </a:p>
@@ -1815,7 +1815,7 @@
           <a:p>
             <a:fld id="{68F73182-45FD-4099-A5BA-1AFBC9E3E2B0}" type="datetimeFigureOut">
               <a:rPr lang="en-US" smtClean="0"/>
-              <a:t>5/6/2019</a:t>
+              <a:t>2/22/2020</a:t>
             </a:fld>
             <a:endParaRPr lang="en-US"/>
           </a:p>
@@ -1956,7 +1956,7 @@
           <a:p>
             <a:fld id="{68F73182-45FD-4099-A5BA-1AFBC9E3E2B0}" type="datetimeFigureOut">
               <a:rPr lang="en-US" smtClean="0"/>
-              <a:t>5/6/2019</a:t>
+              <a:t>2/22/2020</a:t>
             </a:fld>
             <a:endParaRPr lang="en-US"/>
           </a:p>
@@ -2069,7 +2069,7 @@
           <a:p>
             <a:fld id="{68F73182-45FD-4099-A5BA-1AFBC9E3E2B0}" type="datetimeFigureOut">
               <a:rPr lang="en-US" smtClean="0"/>
-              <a:t>5/6/2019</a:t>
+              <a:t>2/22/2020</a:t>
             </a:fld>
             <a:endParaRPr lang="en-US"/>
           </a:p>
@@ -2380,7 +2380,7 @@
           <a:p>
             <a:fld id="{68F73182-45FD-4099-A5BA-1AFBC9E3E2B0}" type="datetimeFigureOut">
               <a:rPr lang="en-US" smtClean="0"/>
-              <a:t>5/6/2019</a:t>
+              <a:t>2/22/2020</a:t>
             </a:fld>
             <a:endParaRPr lang="en-US"/>
           </a:p>
@@ -2668,7 +2668,7 @@
           <a:p>
             <a:fld id="{68F73182-45FD-4099-A5BA-1AFBC9E3E2B0}" type="datetimeFigureOut">
               <a:rPr lang="en-US" smtClean="0"/>
-              <a:t>5/6/2019</a:t>
+              <a:t>2/22/2020</a:t>
             </a:fld>
             <a:endParaRPr lang="en-US"/>
           </a:p>
@@ -2909,7 +2909,7 @@
           <a:p>
             <a:fld id="{68F73182-45FD-4099-A5BA-1AFBC9E3E2B0}" type="datetimeFigureOut">
               <a:rPr lang="en-US" smtClean="0"/>
-              <a:t>5/6/2019</a:t>
+              <a:t>2/22/2020</a:t>
             </a:fld>
             <a:endParaRPr lang="en-US"/>
           </a:p>
@@ -3485,59 +3485,6 @@
           </a:fontRef>
         </p:style>
       </p:cxnSp>
-      <p:cxnSp>
-        <p:nvCxnSpPr>
-          <p:cNvPr id="44" name="Straight Arrow Connector 43">
-            <a:extLst>
-              <a:ext uri="{FF2B5EF4-FFF2-40B4-BE49-F238E27FC236}">
-                <a16:creationId xmlns:a16="http://schemas.microsoft.com/office/drawing/2014/main" id="{FD2284D8-D208-4CDC-AB33-E0534AB0A277}"/>
-              </a:ext>
-            </a:extLst>
-          </p:cNvPr>
-          <p:cNvCxnSpPr/>
-          <p:nvPr/>
-        </p:nvCxnSpPr>
-        <p:spPr>
-          <a:xfrm>
-            <a:off x="7404542" y="3614473"/>
-            <a:ext cx="1645841" cy="0"/>
-          </a:xfrm>
-          <a:prstGeom prst="straightConnector1">
-            <a:avLst/>
-          </a:prstGeom>
-          <a:ln w="38100">
-            <a:solidFill>
-              <a:schemeClr val="tx1">
-                <a:lumMod val="65000"/>
-                <a:lumOff val="35000"/>
-              </a:schemeClr>
-            </a:solidFill>
-            <a:prstDash val="dash"/>
-            <a:tailEnd type="triangle"/>
-          </a:ln>
-          <a:effectLst>
-            <a:outerShdw blurRad="50800" dist="38100" dir="2700000" algn="tl" rotWithShape="0">
-              <a:prstClr val="black">
-                <a:alpha val="40000"/>
-              </a:prstClr>
-            </a:outerShdw>
-          </a:effectLst>
-        </p:spPr>
-        <p:style>
-          <a:lnRef idx="1">
-            <a:schemeClr val="accent1"/>
-          </a:lnRef>
-          <a:fillRef idx="0">
-            <a:schemeClr val="accent1"/>
-          </a:fillRef>
-          <a:effectRef idx="0">
-            <a:schemeClr val="accent1"/>
-          </a:effectRef>
-          <a:fontRef idx="minor">
-            <a:schemeClr val="tx1"/>
-          </a:fontRef>
-        </p:style>
-      </p:cxnSp>
       <p:pic>
         <p:nvPicPr>
           <p:cNvPr id="1026" name="Picture 2" descr="Image result for server icon">
@@ -4549,7 +4496,7 @@
         <p:spPr>
           <a:xfrm>
             <a:off x="9176650" y="2820455"/>
-            <a:ext cx="1934693" cy="954107"/>
+            <a:ext cx="1934693" cy="738664"/>
           </a:xfrm>
           <a:prstGeom prst="rect">
             <a:avLst/>
@@ -4600,28 +4547,18 @@
               </a:rPr>
             </a:br>
             <a:r>
-              <a:rPr lang="en-US" sz="1400" b="1" dirty="0">
+              <a:rPr lang="en-US" sz="1400" b="1">
                 <a:solidFill>
                   <a:schemeClr val="bg1"/>
                 </a:solidFill>
               </a:rPr>
               <a:t>MessageReceived()</a:t>
             </a:r>
-            <a:br>
-              <a:rPr lang="en-US" sz="1400" b="1" dirty="0">
-                <a:solidFill>
-                  <a:schemeClr val="bg1"/>
-                </a:solidFill>
-              </a:rPr>
-            </a:br>
-            <a:r>
-              <a:rPr lang="en-US" sz="1400" b="1" dirty="0">
-                <a:solidFill>
-                  <a:schemeClr val="bg1"/>
-                </a:solidFill>
-              </a:rPr>
-              <a:t>StreamReceived()</a:t>
-            </a:r>
+            <a:endParaRPr lang="en-US" sz="1400" b="1" dirty="0">
+              <a:solidFill>
+                <a:schemeClr val="bg1"/>
+              </a:solidFill>
+            </a:endParaRPr>
           </a:p>
         </p:txBody>
       </p:sp>
@@ -4639,8 +4576,8 @@
         </p:nvSpPr>
         <p:spPr>
           <a:xfrm rot="5400000">
-            <a:off x="10426622" y="3106377"/>
-            <a:ext cx="1065997" cy="369332"/>
+            <a:off x="10556594" y="3014934"/>
+            <a:ext cx="806054" cy="369332"/>
           </a:xfrm>
           <a:prstGeom prst="rect">
             <a:avLst/>
@@ -4653,7 +4590,7 @@
           <a:lstStyle/>
           <a:p>
             <a:r>
-              <a:rPr lang="en-US" b="1" dirty="0">
+              <a:rPr lang="en-US" b="1">
                 <a:solidFill>
                   <a:schemeClr val="tx1">
                     <a:lumMod val="50000"/>
@@ -4661,7 +4598,7 @@
                   </a:schemeClr>
                 </a:solidFill>
               </a:rPr>
-              <a:t>Callbacks</a:t>
+              <a:t>Events</a:t>
             </a:r>
             <a:endParaRPr lang="en-US" dirty="0">
               <a:solidFill>

</xml_diff>